<commit_message>
Resized powerpoint arkitektur billede
</commit_message>
<xml_diff>
--- a/Gruppe1Semerprojekt4.pptx
+++ b/Gruppe1Semerprojekt4.pptx
@@ -113,6 +113,11 @@
       </a:defRPr>
     </a:lvl9pPr>
   </p:defaultTextStyle>
+  <p:extLst>
+    <p:ext uri="{EFAFB233-063F-42B5-8137-9DF3F51BA10A}">
+      <p15:sldGuideLst xmlns:p15="http://schemas.microsoft.com/office/powerpoint/2012/main"/>
+    </p:ext>
+  </p:extLst>
 </p:presentation>
 </file>
 
@@ -198,7 +203,7 @@
           <a:p>
             <a:fld id="{5D6B4C13-6326-446C-A820-CFE1C10B236A}" type="datetimeFigureOut">
               <a:rPr lang="en-US" smtClean="0"/>
-              <a:t>13-Jan-17</a:t>
+              <a:t>1/15/2017</a:t>
             </a:fld>
             <a:endParaRPr lang="en-US"/>
           </a:p>
@@ -293,7 +298,6 @@
               <a:rPr lang="en-US"/>
               <a:t>Fifth level</a:t>
             </a:r>
-            <a:endParaRPr lang="en-US"/>
           </a:p>
         </p:txBody>
       </p:sp>
@@ -357,7 +361,7 @@
           <a:p>
             <a:fld id="{15099307-6BCD-4E24-A77E-1DF25F99E131}" type="slidenum">
               <a:rPr lang="en-US" smtClean="0"/>
-              <a:t>‹#›</a:t>
+              <a:t>‹nr.›</a:t>
             </a:fld>
             <a:endParaRPr lang="en-US"/>
           </a:p>
@@ -2467,7 +2471,6 @@
               <a:rPr lang="en-US"/>
               <a:t>Click to edit Master title style</a:t>
             </a:r>
-            <a:endParaRPr lang="en-US"/>
           </a:p>
         </p:txBody>
       </p:sp>
@@ -2532,7 +2535,6 @@
               <a:rPr lang="en-US"/>
               <a:t>Click to edit Master subtitle style</a:t>
             </a:r>
-            <a:endParaRPr lang="en-US"/>
           </a:p>
         </p:txBody>
       </p:sp>
@@ -2553,7 +2555,7 @@
           <a:p>
             <a:fld id="{76A160D7-618B-410A-8FE4-ABCF439E0119}" type="datetimeFigureOut">
               <a:rPr lang="en-US" smtClean="0"/>
-              <a:t>13-Jan-17</a:t>
+              <a:t>1/15/2017</a:t>
             </a:fld>
             <a:endParaRPr lang="en-US"/>
           </a:p>
@@ -2595,7 +2597,7 @@
           <a:p>
             <a:fld id="{FF30A555-8A26-48D3-BC8B-61EBE3CDDDC6}" type="slidenum">
               <a:rPr lang="en-US" smtClean="0"/>
-              <a:t>‹#›</a:t>
+              <a:t>‹nr.›</a:t>
             </a:fld>
             <a:endParaRPr lang="en-US"/>
           </a:p>
@@ -2650,7 +2652,6 @@
               <a:rPr lang="en-US"/>
               <a:t>Click to edit Master title style</a:t>
             </a:r>
-            <a:endParaRPr lang="en-US"/>
           </a:p>
         </p:txBody>
       </p:sp>
@@ -2702,7 +2703,6 @@
               <a:rPr lang="en-US"/>
               <a:t>Fifth level</a:t>
             </a:r>
-            <a:endParaRPr lang="en-US"/>
           </a:p>
         </p:txBody>
       </p:sp>
@@ -2723,7 +2723,7 @@
           <a:p>
             <a:fld id="{76A160D7-618B-410A-8FE4-ABCF439E0119}" type="datetimeFigureOut">
               <a:rPr lang="en-US" smtClean="0"/>
-              <a:t>13-Jan-17</a:t>
+              <a:t>1/15/2017</a:t>
             </a:fld>
             <a:endParaRPr lang="en-US"/>
           </a:p>
@@ -2765,7 +2765,7 @@
           <a:p>
             <a:fld id="{FF30A555-8A26-48D3-BC8B-61EBE3CDDDC6}" type="slidenum">
               <a:rPr lang="en-US" smtClean="0"/>
-              <a:t>‹#›</a:t>
+              <a:t>‹nr.›</a:t>
             </a:fld>
             <a:endParaRPr lang="en-US"/>
           </a:p>
@@ -2825,7 +2825,6 @@
               <a:rPr lang="en-US"/>
               <a:t>Click to edit Master title style</a:t>
             </a:r>
-            <a:endParaRPr lang="en-US"/>
           </a:p>
         </p:txBody>
       </p:sp>
@@ -2882,7 +2881,6 @@
               <a:rPr lang="en-US"/>
               <a:t>Fifth level</a:t>
             </a:r>
-            <a:endParaRPr lang="en-US"/>
           </a:p>
         </p:txBody>
       </p:sp>
@@ -2903,7 +2901,7 @@
           <a:p>
             <a:fld id="{76A160D7-618B-410A-8FE4-ABCF439E0119}" type="datetimeFigureOut">
               <a:rPr lang="en-US" smtClean="0"/>
-              <a:t>13-Jan-17</a:t>
+              <a:t>1/15/2017</a:t>
             </a:fld>
             <a:endParaRPr lang="en-US"/>
           </a:p>
@@ -2945,7 +2943,7 @@
           <a:p>
             <a:fld id="{FF30A555-8A26-48D3-BC8B-61EBE3CDDDC6}" type="slidenum">
               <a:rPr lang="en-US" smtClean="0"/>
-              <a:t>‹#›</a:t>
+              <a:t>‹nr.›</a:t>
             </a:fld>
             <a:endParaRPr lang="en-US"/>
           </a:p>
@@ -3000,7 +2998,6 @@
               <a:rPr lang="en-US"/>
               <a:t>Click to edit Master title style</a:t>
             </a:r>
-            <a:endParaRPr lang="en-US"/>
           </a:p>
         </p:txBody>
       </p:sp>
@@ -3052,7 +3049,6 @@
               <a:rPr lang="en-US"/>
               <a:t>Fifth level</a:t>
             </a:r>
-            <a:endParaRPr lang="en-US"/>
           </a:p>
         </p:txBody>
       </p:sp>
@@ -3073,7 +3069,7 @@
           <a:p>
             <a:fld id="{76A160D7-618B-410A-8FE4-ABCF439E0119}" type="datetimeFigureOut">
               <a:rPr lang="en-US" smtClean="0"/>
-              <a:t>13-Jan-17</a:t>
+              <a:t>1/15/2017</a:t>
             </a:fld>
             <a:endParaRPr lang="en-US"/>
           </a:p>
@@ -3115,7 +3111,7 @@
           <a:p>
             <a:fld id="{FF30A555-8A26-48D3-BC8B-61EBE3CDDDC6}" type="slidenum">
               <a:rPr lang="en-US" smtClean="0"/>
-              <a:t>‹#›</a:t>
+              <a:t>‹nr.›</a:t>
             </a:fld>
             <a:endParaRPr lang="en-US"/>
           </a:p>
@@ -3179,7 +3175,6 @@
               <a:rPr lang="en-US"/>
               <a:t>Click to edit Master title style</a:t>
             </a:r>
-            <a:endParaRPr lang="en-US"/>
           </a:p>
         </p:txBody>
       </p:sp>
@@ -3319,7 +3314,7 @@
           <a:p>
             <a:fld id="{76A160D7-618B-410A-8FE4-ABCF439E0119}" type="datetimeFigureOut">
               <a:rPr lang="en-US" smtClean="0"/>
-              <a:t>13-Jan-17</a:t>
+              <a:t>1/15/2017</a:t>
             </a:fld>
             <a:endParaRPr lang="en-US"/>
           </a:p>
@@ -3361,7 +3356,7 @@
           <a:p>
             <a:fld id="{FF30A555-8A26-48D3-BC8B-61EBE3CDDDC6}" type="slidenum">
               <a:rPr lang="en-US" smtClean="0"/>
-              <a:t>‹#›</a:t>
+              <a:t>‹nr.›</a:t>
             </a:fld>
             <a:endParaRPr lang="en-US"/>
           </a:p>
@@ -3416,7 +3411,6 @@
               <a:rPr lang="en-US"/>
               <a:t>Click to edit Master title style</a:t>
             </a:r>
-            <a:endParaRPr lang="en-US"/>
           </a:p>
         </p:txBody>
       </p:sp>
@@ -3473,7 +3467,6 @@
               <a:rPr lang="en-US"/>
               <a:t>Fifth level</a:t>
             </a:r>
-            <a:endParaRPr lang="en-US"/>
           </a:p>
         </p:txBody>
       </p:sp>
@@ -3530,7 +3523,6 @@
               <a:rPr lang="en-US"/>
               <a:t>Fifth level</a:t>
             </a:r>
-            <a:endParaRPr lang="en-US"/>
           </a:p>
         </p:txBody>
       </p:sp>
@@ -3551,7 +3543,7 @@
           <a:p>
             <a:fld id="{76A160D7-618B-410A-8FE4-ABCF439E0119}" type="datetimeFigureOut">
               <a:rPr lang="en-US" smtClean="0"/>
-              <a:t>13-Jan-17</a:t>
+              <a:t>1/15/2017</a:t>
             </a:fld>
             <a:endParaRPr lang="en-US"/>
           </a:p>
@@ -3593,7 +3585,7 @@
           <a:p>
             <a:fld id="{FF30A555-8A26-48D3-BC8B-61EBE3CDDDC6}" type="slidenum">
               <a:rPr lang="en-US" smtClean="0"/>
-              <a:t>‹#›</a:t>
+              <a:t>‹nr.›</a:t>
             </a:fld>
             <a:endParaRPr lang="en-US"/>
           </a:p>
@@ -3653,7 +3645,6 @@
               <a:rPr lang="en-US"/>
               <a:t>Click to edit Master title style</a:t>
             </a:r>
-            <a:endParaRPr lang="en-US"/>
           </a:p>
         </p:txBody>
       </p:sp>
@@ -3775,7 +3766,6 @@
               <a:rPr lang="en-US"/>
               <a:t>Fifth level</a:t>
             </a:r>
-            <a:endParaRPr lang="en-US"/>
           </a:p>
         </p:txBody>
       </p:sp>
@@ -3897,7 +3887,6 @@
               <a:rPr lang="en-US"/>
               <a:t>Fifth level</a:t>
             </a:r>
-            <a:endParaRPr lang="en-US"/>
           </a:p>
         </p:txBody>
       </p:sp>
@@ -3918,7 +3907,7 @@
           <a:p>
             <a:fld id="{76A160D7-618B-410A-8FE4-ABCF439E0119}" type="datetimeFigureOut">
               <a:rPr lang="en-US" smtClean="0"/>
-              <a:t>13-Jan-17</a:t>
+              <a:t>1/15/2017</a:t>
             </a:fld>
             <a:endParaRPr lang="en-US"/>
           </a:p>
@@ -3960,7 +3949,7 @@
           <a:p>
             <a:fld id="{FF30A555-8A26-48D3-BC8B-61EBE3CDDDC6}" type="slidenum">
               <a:rPr lang="en-US" smtClean="0"/>
-              <a:t>‹#›</a:t>
+              <a:t>‹nr.›</a:t>
             </a:fld>
             <a:endParaRPr lang="en-US"/>
           </a:p>
@@ -4015,7 +4004,6 @@
               <a:rPr lang="en-US"/>
               <a:t>Click to edit Master title style</a:t>
             </a:r>
-            <a:endParaRPr lang="en-US"/>
           </a:p>
         </p:txBody>
       </p:sp>
@@ -4036,7 +4024,7 @@
           <a:p>
             <a:fld id="{76A160D7-618B-410A-8FE4-ABCF439E0119}" type="datetimeFigureOut">
               <a:rPr lang="en-US" smtClean="0"/>
-              <a:t>13-Jan-17</a:t>
+              <a:t>1/15/2017</a:t>
             </a:fld>
             <a:endParaRPr lang="en-US"/>
           </a:p>
@@ -4078,7 +4066,7 @@
           <a:p>
             <a:fld id="{FF30A555-8A26-48D3-BC8B-61EBE3CDDDC6}" type="slidenum">
               <a:rPr lang="en-US" smtClean="0"/>
-              <a:t>‹#›</a:t>
+              <a:t>‹nr.›</a:t>
             </a:fld>
             <a:endParaRPr lang="en-US"/>
           </a:p>
@@ -4131,7 +4119,7 @@
           <a:p>
             <a:fld id="{76A160D7-618B-410A-8FE4-ABCF439E0119}" type="datetimeFigureOut">
               <a:rPr lang="en-US" smtClean="0"/>
-              <a:t>13-Jan-17</a:t>
+              <a:t>1/15/2017</a:t>
             </a:fld>
             <a:endParaRPr lang="en-US"/>
           </a:p>
@@ -4173,7 +4161,7 @@
           <a:p>
             <a:fld id="{FF30A555-8A26-48D3-BC8B-61EBE3CDDDC6}" type="slidenum">
               <a:rPr lang="en-US" smtClean="0"/>
-              <a:t>‹#›</a:t>
+              <a:t>‹nr.›</a:t>
             </a:fld>
             <a:endParaRPr lang="en-US"/>
           </a:p>
@@ -4237,7 +4225,6 @@
               <a:rPr lang="en-US"/>
               <a:t>Click to edit Master title style</a:t>
             </a:r>
-            <a:endParaRPr lang="en-US"/>
           </a:p>
         </p:txBody>
       </p:sp>
@@ -4322,7 +4309,6 @@
               <a:rPr lang="en-US"/>
               <a:t>Fifth level</a:t>
             </a:r>
-            <a:endParaRPr lang="en-US"/>
           </a:p>
         </p:txBody>
       </p:sp>
@@ -4408,7 +4394,7 @@
           <a:p>
             <a:fld id="{76A160D7-618B-410A-8FE4-ABCF439E0119}" type="datetimeFigureOut">
               <a:rPr lang="en-US" smtClean="0"/>
-              <a:t>13-Jan-17</a:t>
+              <a:t>1/15/2017</a:t>
             </a:fld>
             <a:endParaRPr lang="en-US"/>
           </a:p>
@@ -4450,7 +4436,7 @@
           <a:p>
             <a:fld id="{FF30A555-8A26-48D3-BC8B-61EBE3CDDDC6}" type="slidenum">
               <a:rPr lang="en-US" smtClean="0"/>
-              <a:t>‹#›</a:t>
+              <a:t>‹nr.›</a:t>
             </a:fld>
             <a:endParaRPr lang="en-US"/>
           </a:p>
@@ -4514,7 +4500,6 @@
               <a:rPr lang="en-US"/>
               <a:t>Click to edit Master title style</a:t>
             </a:r>
-            <a:endParaRPr lang="en-US"/>
           </a:p>
         </p:txBody>
       </p:sp>
@@ -4661,7 +4646,7 @@
           <a:p>
             <a:fld id="{76A160D7-618B-410A-8FE4-ABCF439E0119}" type="datetimeFigureOut">
               <a:rPr lang="en-US" smtClean="0"/>
-              <a:t>13-Jan-17</a:t>
+              <a:t>1/15/2017</a:t>
             </a:fld>
             <a:endParaRPr lang="en-US"/>
           </a:p>
@@ -4703,7 +4688,7 @@
           <a:p>
             <a:fld id="{FF30A555-8A26-48D3-BC8B-61EBE3CDDDC6}" type="slidenum">
               <a:rPr lang="en-US" smtClean="0"/>
-              <a:t>‹#›</a:t>
+              <a:t>‹nr.›</a:t>
             </a:fld>
             <a:endParaRPr lang="en-US"/>
           </a:p>
@@ -4773,7 +4758,6 @@
               <a:rPr lang="en-US"/>
               <a:t>Click to edit Master title style</a:t>
             </a:r>
-            <a:endParaRPr lang="en-US"/>
           </a:p>
         </p:txBody>
       </p:sp>
@@ -4835,7 +4819,6 @@
               <a:rPr lang="en-US"/>
               <a:t>Fifth level</a:t>
             </a:r>
-            <a:endParaRPr lang="en-US"/>
           </a:p>
         </p:txBody>
       </p:sp>
@@ -4874,7 +4857,7 @@
           <a:p>
             <a:fld id="{76A160D7-618B-410A-8FE4-ABCF439E0119}" type="datetimeFigureOut">
               <a:rPr lang="en-US" smtClean="0"/>
-              <a:t>13-Jan-17</a:t>
+              <a:t>1/15/2017</a:t>
             </a:fld>
             <a:endParaRPr lang="en-US"/>
           </a:p>
@@ -4952,7 +4935,7 @@
           <a:p>
             <a:fld id="{FF30A555-8A26-48D3-BC8B-61EBE3CDDDC6}" type="slidenum">
               <a:rPr lang="en-US" smtClean="0"/>
-              <a:t>‹#›</a:t>
+              <a:t>‹nr.›</a:t>
             </a:fld>
             <a:endParaRPr lang="en-US"/>
           </a:p>
@@ -5561,29 +5544,6 @@
           <a:chExt cx="0" cy="0"/>
         </a:xfrm>
       </p:grpSpPr>
-      <p:sp>
-        <p:nvSpPr>
-          <p:cNvPr id="2" name="Title 1"/>
-          <p:cNvSpPr>
-            <a:spLocks noGrp="1"/>
-          </p:cNvSpPr>
-          <p:nvPr>
-            <p:ph type="title"/>
-          </p:nvPr>
-        </p:nvSpPr>
-        <p:spPr/>
-        <p:txBody>
-          <a:bodyPr/>
-          <a:lstStyle/>
-          <a:p>
-            <a:r>
-              <a:rPr lang="en-US" dirty="0" err="1"/>
-              <a:t>Arkitektur</a:t>
-            </a:r>
-            <a:endParaRPr lang="en-US" dirty="0"/>
-          </a:p>
-        </p:txBody>
-      </p:sp>
       <p:pic>
         <p:nvPicPr>
           <p:cNvPr id="4" name="Content Placeholder 3"/>
@@ -5608,11 +5568,34 @@
         </p:blipFill>
         <p:spPr>
           <a:xfrm>
-            <a:off x="3319809" y="2239389"/>
-            <a:ext cx="5552381" cy="3523809"/>
+            <a:off x="1641989" y="574484"/>
+            <a:ext cx="8576180" cy="5442858"/>
           </a:xfrm>
         </p:spPr>
       </p:pic>
+      <p:sp>
+        <p:nvSpPr>
+          <p:cNvPr id="2" name="Title 1"/>
+          <p:cNvSpPr>
+            <a:spLocks noGrp="1"/>
+          </p:cNvSpPr>
+          <p:nvPr>
+            <p:ph type="title"/>
+          </p:nvPr>
+        </p:nvSpPr>
+        <p:spPr/>
+        <p:txBody>
+          <a:bodyPr/>
+          <a:lstStyle/>
+          <a:p>
+            <a:r>
+              <a:rPr lang="en-US" dirty="0" err="1"/>
+              <a:t>Arkitektur</a:t>
+            </a:r>
+            <a:endParaRPr lang="en-US" dirty="0"/>
+          </a:p>
+        </p:txBody>
+      </p:sp>
     </p:spTree>
     <p:extLst>
       <p:ext uri="{BB962C8B-B14F-4D97-AF65-F5344CB8AC3E}">

</xml_diff>